<commit_message>
adjusted plots and cleaned up variable namings
</commit_message>
<xml_diff>
--- a/inst/misc/workflow.pptx
+++ b/inst/misc/workflow.pptx
@@ -104,6 +104,11 @@
       </a:defRPr>
     </a:lvl9pPr>
   </p:defaultTextStyle>
+  <p:extLst>
+    <p:ext uri="{EFAFB233-063F-42B5-8137-9DF3F51BA10A}">
+      <p15:sldGuideLst xmlns:p15="http://schemas.microsoft.com/office/powerpoint/2012/main"/>
+    </p:ext>
+  </p:extLst>
 </p:presentation>
 </file>
 
@@ -238,7 +243,7 @@
           <a:p>
             <a:fld id="{90165D5E-DA0D-473B-A6F7-5A1A305E6F68}" type="datetimeFigureOut">
               <a:rPr lang="de-DE" smtClean="0"/>
-              <a:t>20.04.2018</a:t>
+              <a:t>25.04.2018</a:t>
             </a:fld>
             <a:endParaRPr lang="de-DE"/>
           </a:p>
@@ -408,7 +413,7 @@
           <a:p>
             <a:fld id="{90165D5E-DA0D-473B-A6F7-5A1A305E6F68}" type="datetimeFigureOut">
               <a:rPr lang="de-DE" smtClean="0"/>
-              <a:t>20.04.2018</a:t>
+              <a:t>25.04.2018</a:t>
             </a:fld>
             <a:endParaRPr lang="de-DE"/>
           </a:p>
@@ -588,7 +593,7 @@
           <a:p>
             <a:fld id="{90165D5E-DA0D-473B-A6F7-5A1A305E6F68}" type="datetimeFigureOut">
               <a:rPr lang="de-DE" smtClean="0"/>
-              <a:t>20.04.2018</a:t>
+              <a:t>25.04.2018</a:t>
             </a:fld>
             <a:endParaRPr lang="de-DE"/>
           </a:p>
@@ -758,7 +763,7 @@
           <a:p>
             <a:fld id="{90165D5E-DA0D-473B-A6F7-5A1A305E6F68}" type="datetimeFigureOut">
               <a:rPr lang="de-DE" smtClean="0"/>
-              <a:t>20.04.2018</a:t>
+              <a:t>25.04.2018</a:t>
             </a:fld>
             <a:endParaRPr lang="de-DE"/>
           </a:p>
@@ -1004,7 +1009,7 @@
           <a:p>
             <a:fld id="{90165D5E-DA0D-473B-A6F7-5A1A305E6F68}" type="datetimeFigureOut">
               <a:rPr lang="de-DE" smtClean="0"/>
-              <a:t>20.04.2018</a:t>
+              <a:t>25.04.2018</a:t>
             </a:fld>
             <a:endParaRPr lang="de-DE"/>
           </a:p>
@@ -1236,7 +1241,7 @@
           <a:p>
             <a:fld id="{90165D5E-DA0D-473B-A6F7-5A1A305E6F68}" type="datetimeFigureOut">
               <a:rPr lang="de-DE" smtClean="0"/>
-              <a:t>20.04.2018</a:t>
+              <a:t>25.04.2018</a:t>
             </a:fld>
             <a:endParaRPr lang="de-DE"/>
           </a:p>
@@ -1603,7 +1608,7 @@
           <a:p>
             <a:fld id="{90165D5E-DA0D-473B-A6F7-5A1A305E6F68}" type="datetimeFigureOut">
               <a:rPr lang="de-DE" smtClean="0"/>
-              <a:t>20.04.2018</a:t>
+              <a:t>25.04.2018</a:t>
             </a:fld>
             <a:endParaRPr lang="de-DE"/>
           </a:p>
@@ -1721,7 +1726,7 @@
           <a:p>
             <a:fld id="{90165D5E-DA0D-473B-A6F7-5A1A305E6F68}" type="datetimeFigureOut">
               <a:rPr lang="de-DE" smtClean="0"/>
-              <a:t>20.04.2018</a:t>
+              <a:t>25.04.2018</a:t>
             </a:fld>
             <a:endParaRPr lang="de-DE"/>
           </a:p>
@@ -1816,7 +1821,7 @@
           <a:p>
             <a:fld id="{90165D5E-DA0D-473B-A6F7-5A1A305E6F68}" type="datetimeFigureOut">
               <a:rPr lang="de-DE" smtClean="0"/>
-              <a:t>20.04.2018</a:t>
+              <a:t>25.04.2018</a:t>
             </a:fld>
             <a:endParaRPr lang="de-DE"/>
           </a:p>
@@ -2093,7 +2098,7 @@
           <a:p>
             <a:fld id="{90165D5E-DA0D-473B-A6F7-5A1A305E6F68}" type="datetimeFigureOut">
               <a:rPr lang="de-DE" smtClean="0"/>
-              <a:t>20.04.2018</a:t>
+              <a:t>25.04.2018</a:t>
             </a:fld>
             <a:endParaRPr lang="de-DE"/>
           </a:p>
@@ -2346,7 +2351,7 @@
           <a:p>
             <a:fld id="{90165D5E-DA0D-473B-A6F7-5A1A305E6F68}" type="datetimeFigureOut">
               <a:rPr lang="de-DE" smtClean="0"/>
-              <a:t>20.04.2018</a:t>
+              <a:t>25.04.2018</a:t>
             </a:fld>
             <a:endParaRPr lang="de-DE"/>
           </a:p>
@@ -2559,7 +2564,7 @@
           <a:p>
             <a:fld id="{90165D5E-DA0D-473B-A6F7-5A1A305E6F68}" type="datetimeFigureOut">
               <a:rPr lang="de-DE" smtClean="0"/>
-              <a:t>20.04.2018</a:t>
+              <a:t>25.04.2018</a:t>
             </a:fld>
             <a:endParaRPr lang="de-DE"/>
           </a:p>
@@ -2972,8 +2977,8 @@
         </p:nvSpPr>
         <p:spPr>
           <a:xfrm>
-            <a:off x="8793377" y="350517"/>
-            <a:ext cx="1511300" cy="2396801"/>
+            <a:off x="8793377" y="350516"/>
+            <a:ext cx="1511300" cy="2520953"/>
           </a:xfrm>
           <a:prstGeom prst="can">
             <a:avLst/>
@@ -3049,8 +3054,8 @@
         </p:nvGrpSpPr>
         <p:grpSpPr>
           <a:xfrm>
-            <a:off x="95250" y="47711"/>
-            <a:ext cx="1625600" cy="4573716"/>
+            <a:off x="95249" y="47710"/>
+            <a:ext cx="1722693" cy="4622187"/>
             <a:chOff x="857250" y="558800"/>
             <a:chExt cx="1625600" cy="4724400"/>
           </a:xfrm>
@@ -3317,12 +3322,12 @@
             <a:p>
               <a:pPr algn="ctr"/>
               <a:r>
-                <a:rPr lang="de-DE" dirty="0" smtClean="0">
+                <a:rPr lang="de-DE" dirty="0" err="1" smtClean="0">
                   <a:solidFill>
                     <a:srgbClr val="800080"/>
                   </a:solidFill>
                 </a:rPr>
-                <a:t>ATC</a:t>
+                <a:t>DrugBank</a:t>
               </a:r>
               <a:endParaRPr lang="de-DE" dirty="0">
                 <a:solidFill>
@@ -3506,8 +3511,8 @@
         </p:nvSpPr>
         <p:spPr>
           <a:xfrm>
-            <a:off x="1820325" y="1896419"/>
-            <a:ext cx="1143000" cy="876300"/>
+            <a:off x="1940294" y="1700290"/>
+            <a:ext cx="1186984" cy="876300"/>
           </a:xfrm>
           <a:prstGeom prst="rightArrow">
             <a:avLst/>
@@ -3543,14 +3548,184 @@
       </p:sp>
       <p:sp>
         <p:nvSpPr>
+          <p:cNvPr id="30" name="Pfeil nach links und rechts 29"/>
+          <p:cNvSpPr/>
+          <p:nvPr/>
+        </p:nvSpPr>
+        <p:spPr>
+          <a:xfrm>
+            <a:off x="7336559" y="978318"/>
+            <a:ext cx="1332325" cy="876299"/>
+          </a:xfrm>
+          <a:prstGeom prst="leftRightArrow">
+            <a:avLst/>
+          </a:prstGeom>
+          <a:solidFill>
+            <a:srgbClr val="800080"/>
+          </a:solidFill>
+        </p:spPr>
+        <p:style>
+          <a:lnRef idx="2">
+            <a:schemeClr val="accent1">
+              <a:shade val="50000"/>
+            </a:schemeClr>
+          </a:lnRef>
+          <a:fillRef idx="1">
+            <a:schemeClr val="accent1"/>
+          </a:fillRef>
+          <a:effectRef idx="0">
+            <a:schemeClr val="accent1"/>
+          </a:effectRef>
+          <a:fontRef idx="minor">
+            <a:schemeClr val="lt1"/>
+          </a:fontRef>
+        </p:style>
+        <p:txBody>
+          <a:bodyPr rtlCol="0" anchor="ctr"/>
+          <a:lstStyle/>
+          <a:p>
+            <a:pPr algn="ctr"/>
+            <a:endParaRPr lang="de-DE"/>
+          </a:p>
+        </p:txBody>
+      </p:sp>
+      <p:sp>
+        <p:nvSpPr>
+          <p:cNvPr id="32" name="Diagonal liegende Ecken des Rechtecks abrunden 31"/>
+          <p:cNvSpPr/>
+          <p:nvPr/>
+        </p:nvSpPr>
+        <p:spPr>
+          <a:xfrm>
+            <a:off x="8793377" y="3102421"/>
+            <a:ext cx="1511300" cy="1375537"/>
+          </a:xfrm>
+          <a:prstGeom prst="round2DiagRect">
+            <a:avLst/>
+          </a:prstGeom>
+          <a:solidFill>
+            <a:srgbClr val="40E0D0"/>
+          </a:solidFill>
+        </p:spPr>
+        <p:style>
+          <a:lnRef idx="2">
+            <a:schemeClr val="accent1">
+              <a:shade val="50000"/>
+            </a:schemeClr>
+          </a:lnRef>
+          <a:fillRef idx="1">
+            <a:schemeClr val="accent1"/>
+          </a:fillRef>
+          <a:effectRef idx="0">
+            <a:schemeClr val="accent1"/>
+          </a:effectRef>
+          <a:fontRef idx="minor">
+            <a:schemeClr val="lt1"/>
+          </a:fontRef>
+        </p:style>
+        <p:txBody>
+          <a:bodyPr rtlCol="0" anchor="ctr"/>
+          <a:lstStyle/>
+          <a:p>
+            <a:pPr algn="ctr"/>
+            <a:r>
+              <a:rPr lang="de-DE" dirty="0" smtClean="0">
+                <a:solidFill>
+                  <a:srgbClr val="800080"/>
+                </a:solidFill>
+              </a:rPr>
+              <a:t>R</a:t>
+            </a:r>
+          </a:p>
+          <a:p>
+            <a:pPr algn="ctr"/>
+            <a:r>
+              <a:rPr lang="de-DE" dirty="0" smtClean="0">
+                <a:solidFill>
+                  <a:srgbClr val="800080"/>
+                </a:solidFill>
+              </a:rPr>
+              <a:t>Data</a:t>
+            </a:r>
+          </a:p>
+          <a:p>
+            <a:pPr algn="ctr"/>
+            <a:r>
+              <a:rPr lang="de-DE" dirty="0" smtClean="0">
+                <a:solidFill>
+                  <a:srgbClr val="800080"/>
+                </a:solidFill>
+              </a:rPr>
+              <a:t>Analysis</a:t>
+            </a:r>
+          </a:p>
+          <a:p>
+            <a:pPr algn="ctr"/>
+            <a:endParaRPr lang="de-DE" dirty="0">
+              <a:solidFill>
+                <a:srgbClr val="800080"/>
+              </a:solidFill>
+            </a:endParaRPr>
+          </a:p>
+        </p:txBody>
+      </p:sp>
+      <p:sp>
+        <p:nvSpPr>
+          <p:cNvPr id="35" name="Nach rechts gekrümmter Pfeil 34"/>
+          <p:cNvSpPr/>
+          <p:nvPr/>
+        </p:nvSpPr>
+        <p:spPr>
+          <a:xfrm>
+            <a:off x="7821609" y="2456586"/>
+            <a:ext cx="847275" cy="1630836"/>
+          </a:xfrm>
+          <a:prstGeom prst="curvedRightArrow">
+            <a:avLst/>
+          </a:prstGeom>
+          <a:solidFill>
+            <a:srgbClr val="800080"/>
+          </a:solidFill>
+        </p:spPr>
+        <p:style>
+          <a:lnRef idx="2">
+            <a:schemeClr val="accent1">
+              <a:shade val="50000"/>
+            </a:schemeClr>
+          </a:lnRef>
+          <a:fillRef idx="1">
+            <a:schemeClr val="accent1"/>
+          </a:fillRef>
+          <a:effectRef idx="0">
+            <a:schemeClr val="accent1"/>
+          </a:effectRef>
+          <a:fontRef idx="minor">
+            <a:schemeClr val="lt1"/>
+          </a:fontRef>
+        </p:style>
+        <p:txBody>
+          <a:bodyPr rtlCol="0" anchor="ctr"/>
+          <a:lstStyle/>
+          <a:p>
+            <a:pPr algn="ctr"/>
+            <a:endParaRPr lang="de-DE">
+              <a:solidFill>
+                <a:schemeClr val="tx1"/>
+              </a:solidFill>
+            </a:endParaRPr>
+          </a:p>
+        </p:txBody>
+      </p:sp>
+      <p:sp>
+        <p:nvSpPr>
           <p:cNvPr id="19" name="Diagonal liegende Ecken des Rechtecks schneiden 18"/>
           <p:cNvSpPr/>
           <p:nvPr/>
         </p:nvSpPr>
         <p:spPr>
           <a:xfrm>
-            <a:off x="3295135" y="799070"/>
-            <a:ext cx="3769260" cy="3369276"/>
+            <a:off x="3249630" y="550620"/>
+            <a:ext cx="3987566" cy="3536802"/>
           </a:xfrm>
           <a:prstGeom prst="snip2DiagRect">
             <a:avLst/>
@@ -3636,7 +3811,7 @@
           </a:p>
           <a:p>
             <a:pPr algn="ctr"/>
-            <a:endParaRPr lang="de-DE" dirty="0">
+            <a:endParaRPr lang="de-DE" dirty="0" smtClean="0">
               <a:solidFill>
                 <a:srgbClr val="800080"/>
               </a:solidFill>
@@ -3660,6 +3835,14 @@
           </a:p>
           <a:p>
             <a:pPr algn="ctr"/>
+            <a:endParaRPr lang="de-DE" dirty="0" smtClean="0">
+              <a:solidFill>
+                <a:srgbClr val="800080"/>
+              </a:solidFill>
+            </a:endParaRPr>
+          </a:p>
+          <a:p>
+            <a:pPr algn="ctr"/>
             <a:r>
               <a:rPr lang="de-DE" dirty="0" smtClean="0">
                 <a:solidFill>
@@ -3700,8 +3883,8 @@
         </p:nvSpPr>
         <p:spPr>
           <a:xfrm>
-            <a:off x="3444895" y="969319"/>
-            <a:ext cx="1181100" cy="825500"/>
+            <a:off x="3468916" y="958150"/>
+            <a:ext cx="1181100" cy="837775"/>
           </a:xfrm>
           <a:prstGeom prst="roundRect">
             <a:avLst/>
@@ -3766,8 +3949,8 @@
         </p:nvSpPr>
         <p:spPr>
           <a:xfrm>
-            <a:off x="5521345" y="1007419"/>
-            <a:ext cx="1181100" cy="825500"/>
+            <a:off x="3482667" y="2456586"/>
+            <a:ext cx="1167349" cy="837775"/>
           </a:xfrm>
           <a:prstGeom prst="roundRect">
             <a:avLst/>
@@ -3831,14 +4014,57 @@
       </p:sp>
       <p:sp>
         <p:nvSpPr>
+          <p:cNvPr id="24" name="Pfeil nach rechts 23"/>
+          <p:cNvSpPr/>
+          <p:nvPr/>
+        </p:nvSpPr>
+        <p:spPr>
+          <a:xfrm rot="5400000">
+            <a:off x="3793359" y="1895303"/>
+            <a:ext cx="543274" cy="461905"/>
+          </a:xfrm>
+          <a:prstGeom prst="rightArrow">
+            <a:avLst/>
+          </a:prstGeom>
+          <a:solidFill>
+            <a:srgbClr val="800080"/>
+          </a:solidFill>
+        </p:spPr>
+        <p:style>
+          <a:lnRef idx="2">
+            <a:schemeClr val="accent1">
+              <a:shade val="50000"/>
+            </a:schemeClr>
+          </a:lnRef>
+          <a:fillRef idx="1">
+            <a:schemeClr val="accent1"/>
+          </a:fillRef>
+          <a:effectRef idx="0">
+            <a:schemeClr val="accent1"/>
+          </a:effectRef>
+          <a:fontRef idx="minor">
+            <a:schemeClr val="lt1"/>
+          </a:fontRef>
+        </p:style>
+        <p:txBody>
+          <a:bodyPr rtlCol="0" anchor="ctr"/>
+          <a:lstStyle/>
+          <a:p>
+            <a:pPr algn="ctr"/>
+            <a:endParaRPr lang="de-DE"/>
+          </a:p>
+        </p:txBody>
+      </p:sp>
+      <p:sp>
+        <p:nvSpPr>
           <p:cNvPr id="22" name="Abgerundetes Rechteck 21"/>
           <p:cNvSpPr/>
           <p:nvPr/>
         </p:nvSpPr>
         <p:spPr>
           <a:xfrm>
-            <a:off x="3444895" y="2544814"/>
-            <a:ext cx="1181100" cy="825500"/>
+            <a:off x="5492262" y="2456586"/>
+            <a:ext cx="1181100" cy="837775"/>
           </a:xfrm>
           <a:prstGeom prst="roundRect">
             <a:avLst/>
@@ -3903,8 +4129,8 @@
         </p:nvSpPr>
         <p:spPr>
           <a:xfrm>
-            <a:off x="5521345" y="2544814"/>
-            <a:ext cx="1181100" cy="825500"/>
+            <a:off x="5492262" y="958148"/>
+            <a:ext cx="1181100" cy="837775"/>
           </a:xfrm>
           <a:prstGeom prst="roundRect">
             <a:avLst/>
@@ -3968,14 +4194,14 @@
       </p:sp>
       <p:sp>
         <p:nvSpPr>
-          <p:cNvPr id="24" name="Pfeil nach rechts 23"/>
+          <p:cNvPr id="27" name="Pfeil nach rechts 26"/>
           <p:cNvSpPr/>
           <p:nvPr/>
         </p:nvSpPr>
         <p:spPr>
           <a:xfrm>
-            <a:off x="4772045" y="1286472"/>
-            <a:ext cx="603250" cy="330200"/>
+            <a:off x="4757178" y="2640516"/>
+            <a:ext cx="630753" cy="461905"/>
           </a:xfrm>
           <a:prstGeom prst="rightArrow">
             <a:avLst/>
@@ -4011,14 +4237,14 @@
       </p:sp>
       <p:sp>
         <p:nvSpPr>
-          <p:cNvPr id="25" name="Pfeil nach rechts 24"/>
+          <p:cNvPr id="29" name="Pfeil nach rechts 28"/>
           <p:cNvSpPr/>
           <p:nvPr/>
         </p:nvSpPr>
         <p:spPr>
-          <a:xfrm rot="8068520">
-            <a:off x="4772046" y="2048819"/>
-            <a:ext cx="603250" cy="330200"/>
+          <a:xfrm rot="16200000">
+            <a:off x="5811175" y="1895302"/>
+            <a:ext cx="543274" cy="461905"/>
           </a:xfrm>
           <a:prstGeom prst="rightArrow">
             <a:avLst/>
@@ -4049,219 +4275,6 @@
           <a:p>
             <a:pPr algn="ctr"/>
             <a:endParaRPr lang="de-DE"/>
-          </a:p>
-        </p:txBody>
-      </p:sp>
-      <p:sp>
-        <p:nvSpPr>
-          <p:cNvPr id="26" name="Pfeil nach rechts 25"/>
-          <p:cNvSpPr/>
-          <p:nvPr/>
-        </p:nvSpPr>
-        <p:spPr>
-          <a:xfrm>
-            <a:off x="4772045" y="2747319"/>
-            <a:ext cx="603250" cy="330200"/>
-          </a:xfrm>
-          <a:prstGeom prst="rightArrow">
-            <a:avLst/>
-          </a:prstGeom>
-          <a:solidFill>
-            <a:srgbClr val="800080"/>
-          </a:solidFill>
-        </p:spPr>
-        <p:style>
-          <a:lnRef idx="2">
-            <a:schemeClr val="accent1">
-              <a:shade val="50000"/>
-            </a:schemeClr>
-          </a:lnRef>
-          <a:fillRef idx="1">
-            <a:schemeClr val="accent1"/>
-          </a:fillRef>
-          <a:effectRef idx="0">
-            <a:schemeClr val="accent1"/>
-          </a:effectRef>
-          <a:fontRef idx="minor">
-            <a:schemeClr val="lt1"/>
-          </a:fontRef>
-        </p:style>
-        <p:txBody>
-          <a:bodyPr rtlCol="0" anchor="ctr"/>
-          <a:lstStyle/>
-          <a:p>
-            <a:pPr algn="ctr"/>
-            <a:endParaRPr lang="de-DE"/>
-          </a:p>
-        </p:txBody>
-      </p:sp>
-      <p:sp>
-        <p:nvSpPr>
-          <p:cNvPr id="30" name="Pfeil nach links und rechts 29"/>
-          <p:cNvSpPr/>
-          <p:nvPr/>
-        </p:nvSpPr>
-        <p:spPr>
-          <a:xfrm>
-            <a:off x="7210445" y="1020120"/>
-            <a:ext cx="1357184" cy="876299"/>
-          </a:xfrm>
-          <a:prstGeom prst="leftRightArrow">
-            <a:avLst/>
-          </a:prstGeom>
-          <a:solidFill>
-            <a:srgbClr val="800080"/>
-          </a:solidFill>
-        </p:spPr>
-        <p:style>
-          <a:lnRef idx="2">
-            <a:schemeClr val="accent1">
-              <a:shade val="50000"/>
-            </a:schemeClr>
-          </a:lnRef>
-          <a:fillRef idx="1">
-            <a:schemeClr val="accent1"/>
-          </a:fillRef>
-          <a:effectRef idx="0">
-            <a:schemeClr val="accent1"/>
-          </a:effectRef>
-          <a:fontRef idx="minor">
-            <a:schemeClr val="lt1"/>
-          </a:fontRef>
-        </p:style>
-        <p:txBody>
-          <a:bodyPr rtlCol="0" anchor="ctr"/>
-          <a:lstStyle/>
-          <a:p>
-            <a:pPr algn="ctr"/>
-            <a:endParaRPr lang="de-DE"/>
-          </a:p>
-        </p:txBody>
-      </p:sp>
-      <p:sp>
-        <p:nvSpPr>
-          <p:cNvPr id="32" name="Diagonal liegende Ecken des Rechtecks abrunden 31"/>
-          <p:cNvSpPr/>
-          <p:nvPr/>
-        </p:nvSpPr>
-        <p:spPr>
-          <a:xfrm>
-            <a:off x="8793377" y="2891481"/>
-            <a:ext cx="1511300" cy="1729947"/>
-          </a:xfrm>
-          <a:prstGeom prst="round2DiagRect">
-            <a:avLst/>
-          </a:prstGeom>
-          <a:solidFill>
-            <a:srgbClr val="40E0D0"/>
-          </a:solidFill>
-        </p:spPr>
-        <p:style>
-          <a:lnRef idx="2">
-            <a:schemeClr val="accent1">
-              <a:shade val="50000"/>
-            </a:schemeClr>
-          </a:lnRef>
-          <a:fillRef idx="1">
-            <a:schemeClr val="accent1"/>
-          </a:fillRef>
-          <a:effectRef idx="0">
-            <a:schemeClr val="accent1"/>
-          </a:effectRef>
-          <a:fontRef idx="minor">
-            <a:schemeClr val="lt1"/>
-          </a:fontRef>
-        </p:style>
-        <p:txBody>
-          <a:bodyPr rtlCol="0" anchor="ctr"/>
-          <a:lstStyle/>
-          <a:p>
-            <a:pPr algn="ctr"/>
-            <a:r>
-              <a:rPr lang="de-DE" dirty="0" smtClean="0">
-                <a:solidFill>
-                  <a:srgbClr val="800080"/>
-                </a:solidFill>
-              </a:rPr>
-              <a:t>R</a:t>
-            </a:r>
-          </a:p>
-          <a:p>
-            <a:pPr algn="ctr"/>
-            <a:r>
-              <a:rPr lang="de-DE" dirty="0" smtClean="0">
-                <a:solidFill>
-                  <a:srgbClr val="800080"/>
-                </a:solidFill>
-              </a:rPr>
-              <a:t>Data</a:t>
-            </a:r>
-          </a:p>
-          <a:p>
-            <a:pPr algn="ctr"/>
-            <a:r>
-              <a:rPr lang="de-DE" dirty="0" smtClean="0">
-                <a:solidFill>
-                  <a:srgbClr val="800080"/>
-                </a:solidFill>
-              </a:rPr>
-              <a:t>Analysis</a:t>
-            </a:r>
-          </a:p>
-          <a:p>
-            <a:pPr algn="ctr"/>
-            <a:endParaRPr lang="de-DE" dirty="0">
-              <a:solidFill>
-                <a:srgbClr val="800080"/>
-              </a:solidFill>
-            </a:endParaRPr>
-          </a:p>
-        </p:txBody>
-      </p:sp>
-      <p:sp>
-        <p:nvSpPr>
-          <p:cNvPr id="35" name="Nach rechts gekrümmter Pfeil 34"/>
-          <p:cNvSpPr/>
-          <p:nvPr/>
-        </p:nvSpPr>
-        <p:spPr>
-          <a:xfrm>
-            <a:off x="7396206" y="2150076"/>
-            <a:ext cx="1225722" cy="2018270"/>
-          </a:xfrm>
-          <a:prstGeom prst="curvedRightArrow">
-            <a:avLst/>
-          </a:prstGeom>
-          <a:solidFill>
-            <a:srgbClr val="800080"/>
-          </a:solidFill>
-        </p:spPr>
-        <p:style>
-          <a:lnRef idx="2">
-            <a:schemeClr val="accent1">
-              <a:shade val="50000"/>
-            </a:schemeClr>
-          </a:lnRef>
-          <a:fillRef idx="1">
-            <a:schemeClr val="accent1"/>
-          </a:fillRef>
-          <a:effectRef idx="0">
-            <a:schemeClr val="accent1"/>
-          </a:effectRef>
-          <a:fontRef idx="minor">
-            <a:schemeClr val="lt1"/>
-          </a:fontRef>
-        </p:style>
-        <p:txBody>
-          <a:bodyPr rtlCol="0" anchor="ctr"/>
-          <a:lstStyle/>
-          <a:p>
-            <a:pPr algn="ctr"/>
-            <a:endParaRPr lang="de-DE">
-              <a:solidFill>
-                <a:schemeClr val="tx1"/>
-              </a:solidFill>
-            </a:endParaRPr>
           </a:p>
         </p:txBody>
       </p:sp>

</xml_diff>